<commit_message>
Formatanpassungen und Folien zu Dockerfile
</commit_message>
<xml_diff>
--- a/slides/Tag-3_4-Deployment-Strategien.pptx
+++ b/slides/Tag-3_4-Deployment-Strategien.pptx
@@ -16,14 +16,14 @@
     <p:sldId id="290" r:id="rId4"/>
     <p:sldId id="291" r:id="rId5"/>
     <p:sldId id="292" r:id="rId6"/>
-    <p:sldId id="293" r:id="rId7"/>
+    <p:sldId id="302" r:id="rId7"/>
     <p:sldId id="294" r:id="rId8"/>
-    <p:sldId id="297" r:id="rId9"/>
+    <p:sldId id="301" r:id="rId9"/>
     <p:sldId id="298" r:id="rId10"/>
     <p:sldId id="296" r:id="rId11"/>
-    <p:sldId id="295" r:id="rId12"/>
+    <p:sldId id="303" r:id="rId12"/>
     <p:sldId id="299" r:id="rId13"/>
-    <p:sldId id="300" r:id="rId14"/>
+    <p:sldId id="304" r:id="rId14"/>
   </p:sldIdLst>
   <p:sldSz cx="9144000" cy="6858000" type="screen4x3"/>
   <p:notesSz cx="6784975" cy="9921875"/>
@@ -161,14 +161,14 @@
             <p14:sldId id="290"/>
             <p14:sldId id="291"/>
             <p14:sldId id="292"/>
-            <p14:sldId id="293"/>
+            <p14:sldId id="302"/>
             <p14:sldId id="294"/>
-            <p14:sldId id="297"/>
+            <p14:sldId id="301"/>
             <p14:sldId id="298"/>
             <p14:sldId id="296"/>
-            <p14:sldId id="295"/>
+            <p14:sldId id="303"/>
             <p14:sldId id="299"/>
-            <p14:sldId id="300"/>
+            <p14:sldId id="304"/>
           </p14:sldIdLst>
         </p14:section>
       </p14:sectionLst>
@@ -1300,7 +1300,7 @@
               <a:pPr algn="ctr">
                 <a:defRPr/>
               </a:pPr>
-              <a:t>04.06.2024</a:t>
+              <a:t>06.06.2024</a:t>
             </a:fld>
             <a:endParaRPr lang="de-DE" sz="1000">
               <a:solidFill>
@@ -3346,7 +3346,7 @@
           <p:cNvPr id="2" name="Titel 1">
             <a:extLst>
               <a:ext uri="{FF2B5EF4-FFF2-40B4-BE49-F238E27FC236}">
-                <a16:creationId xmlns:a16="http://schemas.microsoft.com/office/drawing/2014/main" id="{D99BAD01-A920-7F80-9D35-9B44F14A75EF}"/>
+                <a16:creationId xmlns:a16="http://schemas.microsoft.com/office/drawing/2014/main" id="{2D37A3AA-5D50-D381-93DD-F35F9DA17F9F}"/>
               </a:ext>
             </a:extLst>
           </p:cNvPr>
@@ -3376,54 +3376,10 @@
       </p:sp>
       <p:sp>
         <p:nvSpPr>
-          <p:cNvPr id="5" name="Textfeld 4">
-            <a:extLst>
-              <a:ext uri="{FF2B5EF4-FFF2-40B4-BE49-F238E27FC236}">
-                <a16:creationId xmlns:a16="http://schemas.microsoft.com/office/drawing/2014/main" id="{B391B747-BBA4-21F1-3683-E6C2DC8AA3C6}"/>
-              </a:ext>
-            </a:extLst>
-          </p:cNvPr>
-          <p:cNvSpPr txBox="1"/>
-          <p:nvPr/>
-        </p:nvSpPr>
-        <p:spPr bwMode="auto">
-          <a:xfrm>
-            <a:off x="330324" y="1079972"/>
-            <a:ext cx="8462714" cy="584775"/>
-          </a:xfrm>
-          <a:prstGeom prst="rect">
-            <a:avLst/>
-          </a:prstGeom>
-          <a:noFill/>
-          <a:ln w="9525">
-            <a:noFill/>
-            <a:miter lim="800000"/>
-            <a:headEnd/>
-            <a:tailEnd/>
-          </a:ln>
-        </p:spPr>
-        <p:txBody>
-          <a:bodyPr wrap="square" rtlCol="0" anchor="ctr">
-            <a:spAutoFit/>
-          </a:bodyPr>
-          <a:lstStyle/>
-          <a:p>
-            <a:pPr algn="ctr" eaLnBrk="1" hangingPunct="1"/>
-            <a:r>
-              <a:rPr lang="de-DE" sz="3200" dirty="0">
-                <a:latin typeface="+mj-lt"/>
-              </a:rPr>
-              <a:t>Vor und Nachteile</a:t>
-            </a:r>
-          </a:p>
-        </p:txBody>
-      </p:sp>
-      <p:sp>
-        <p:nvSpPr>
           <p:cNvPr id="3" name="Inhaltsplatzhalter 2">
             <a:extLst>
               <a:ext uri="{FF2B5EF4-FFF2-40B4-BE49-F238E27FC236}">
-                <a16:creationId xmlns:a16="http://schemas.microsoft.com/office/drawing/2014/main" id="{B3231207-F7BC-F792-92B9-48E8C8E01816}"/>
+                <a16:creationId xmlns:a16="http://schemas.microsoft.com/office/drawing/2014/main" id="{A9CE9B1E-CEEF-DB0F-DA70-6E5EAE80B685}"/>
               </a:ext>
             </a:extLst>
           </p:cNvPr>
@@ -3434,16 +3390,20 @@
             <p:ph idx="1"/>
           </p:nvPr>
         </p:nvSpPr>
-        <p:spPr>
-          <a:xfrm>
-            <a:off x="683568" y="1988840"/>
-            <a:ext cx="3764731" cy="3960440"/>
-          </a:xfrm>
-        </p:spPr>
+        <p:spPr/>
         <p:txBody>
           <a:bodyPr/>
           <a:lstStyle/>
           <a:p>
+            <a:pPr marL="0" indent="0">
+              <a:buNone/>
+            </a:pPr>
+            <a:r>
+              <a:rPr lang="de-DE" b="1" dirty="0"/>
+              <a:t>Vorteile</a:t>
+            </a:r>
+          </a:p>
+          <a:p>
             <a:pPr>
               <a:buFont typeface="Arial" panose="020B0604020202020204" pitchFamily="34" charset="0"/>
               <a:buChar char="•"/>
@@ -3474,241 +3434,30 @@
             </a:r>
           </a:p>
           <a:p>
+            <a:pPr marL="0" indent="0">
+              <a:buNone/>
+            </a:pPr>
+            <a:endParaRPr lang="de-DE" b="1" dirty="0"/>
+          </a:p>
+          <a:p>
+            <a:pPr marL="0" indent="0">
+              <a:buNone/>
+            </a:pPr>
+            <a:r>
+              <a:rPr lang="de-DE" b="1" dirty="0"/>
+              <a:t>Nachteile</a:t>
+            </a:r>
+          </a:p>
+          <a:p>
             <a:pPr>
               <a:buFont typeface="Arial" panose="020B0604020202020204" pitchFamily="34" charset="0"/>
               <a:buChar char="•"/>
             </a:pPr>
-            <a:endParaRPr lang="de-DE" altLang="de-DE" dirty="0"/>
-          </a:p>
-        </p:txBody>
-      </p:sp>
-      <p:sp>
-        <p:nvSpPr>
-          <p:cNvPr id="4" name="Inhaltsplatzhalter 2">
-            <a:extLst>
-              <a:ext uri="{FF2B5EF4-FFF2-40B4-BE49-F238E27FC236}">
-                <a16:creationId xmlns:a16="http://schemas.microsoft.com/office/drawing/2014/main" id="{0EDA6666-E721-7B60-2CB5-59117D00AFAA}"/>
-              </a:ext>
-            </a:extLst>
-          </p:cNvPr>
-          <p:cNvSpPr txBox="1">
-            <a:spLocks/>
-          </p:cNvSpPr>
-          <p:nvPr/>
-        </p:nvSpPr>
-        <p:spPr bwMode="auto">
-          <a:xfrm>
-            <a:off x="4693773" y="1988840"/>
-            <a:ext cx="3764731" cy="3960440"/>
-          </a:xfrm>
-          <a:prstGeom prst="rect">
-            <a:avLst/>
-          </a:prstGeom>
-          <a:noFill/>
-          <a:ln>
-            <a:noFill/>
-          </a:ln>
-          <a:extLst>
-            <a:ext uri="{909E8E84-426E-40DD-AFC4-6F175D3DCCD1}">
-              <a14:hiddenFill xmlns:a14="http://schemas.microsoft.com/office/drawing/2010/main">
-                <a:solidFill>
-                  <a:srgbClr val="FFFFFF"/>
-                </a:solidFill>
-              </a14:hiddenFill>
-            </a:ext>
-            <a:ext uri="{91240B29-F687-4F45-9708-019B960494DF}">
-              <a14:hiddenLine xmlns:a14="http://schemas.microsoft.com/office/drawing/2010/main" w="9525">
-                <a:solidFill>
-                  <a:srgbClr val="000000"/>
-                </a:solidFill>
-                <a:miter lim="800000"/>
-                <a:headEnd/>
-                <a:tailEnd/>
-              </a14:hiddenLine>
-            </a:ext>
-          </a:extLst>
-        </p:spPr>
-        <p:txBody>
-          <a:bodyPr vert="horz" wrap="square" lIns="92075" tIns="46038" rIns="92075" bIns="46038" numCol="1" anchor="t" anchorCtr="0" compatLnSpc="1">
-            <a:prstTxWarp prst="textNoShape">
-              <a:avLst/>
-            </a:prstTxWarp>
-          </a:bodyPr>
-          <a:lstStyle>
-            <a:lvl1pPr marL="342900" indent="-342900" algn="l" rtl="0" eaLnBrk="1" fontAlgn="base" hangingPunct="1">
-              <a:spcBef>
-                <a:spcPct val="20000"/>
-              </a:spcBef>
-              <a:spcAft>
-                <a:spcPct val="0"/>
-              </a:spcAft>
-              <a:buClr>
-                <a:srgbClr val="008C5A"/>
-              </a:buClr>
-              <a:buFont typeface="Monotype Sorts" pitchFamily="2" charset="2"/>
-              <a:buChar char="l"/>
-              <a:defRPr sz="2400">
-                <a:solidFill>
-                  <a:schemeClr val="tx1"/>
-                </a:solidFill>
-                <a:latin typeface="+mn-lt"/>
-                <a:ea typeface="+mn-ea"/>
-                <a:cs typeface="+mn-cs"/>
-              </a:defRPr>
-            </a:lvl1pPr>
-            <a:lvl2pPr marL="742950" indent="-285750" algn="l" rtl="0" eaLnBrk="1" fontAlgn="base" hangingPunct="1">
-              <a:spcBef>
-                <a:spcPct val="20000"/>
-              </a:spcBef>
-              <a:spcAft>
-                <a:spcPct val="0"/>
-              </a:spcAft>
-              <a:buClr>
-                <a:srgbClr val="008C5A"/>
-              </a:buClr>
-              <a:buFont typeface="Monotype Sorts" pitchFamily="2" charset="2"/>
-              <a:buChar char="l"/>
-              <a:defRPr sz="2000">
-                <a:solidFill>
-                  <a:schemeClr val="tx1"/>
-                </a:solidFill>
-                <a:latin typeface="+mn-lt"/>
-              </a:defRPr>
-            </a:lvl2pPr>
-            <a:lvl3pPr marL="1143000" indent="-228600" algn="l" rtl="0" eaLnBrk="1" fontAlgn="base" hangingPunct="1">
-              <a:spcBef>
-                <a:spcPct val="20000"/>
-              </a:spcBef>
-              <a:spcAft>
-                <a:spcPct val="0"/>
-              </a:spcAft>
-              <a:buClr>
-                <a:srgbClr val="008C5A"/>
-              </a:buClr>
-              <a:buFont typeface="Monotype Sorts" pitchFamily="2" charset="2"/>
-              <a:buChar char="l"/>
-              <a:defRPr sz="2400">
-                <a:solidFill>
-                  <a:schemeClr val="tx1"/>
-                </a:solidFill>
-                <a:latin typeface="+mn-lt"/>
-              </a:defRPr>
-            </a:lvl3pPr>
-            <a:lvl4pPr marL="1562100" indent="-228600" algn="l" rtl="0" eaLnBrk="1" fontAlgn="base" hangingPunct="1">
-              <a:spcBef>
-                <a:spcPct val="20000"/>
-              </a:spcBef>
-              <a:spcAft>
-                <a:spcPct val="0"/>
-              </a:spcAft>
-              <a:buClr>
-                <a:srgbClr val="008C5A"/>
-              </a:buClr>
-              <a:buFont typeface="Monotype Sorts" pitchFamily="2" charset="2"/>
-              <a:buChar char="l"/>
-              <a:defRPr sz="1600">
-                <a:solidFill>
-                  <a:schemeClr val="tx1"/>
-                </a:solidFill>
-                <a:latin typeface="+mn-lt"/>
-              </a:defRPr>
-            </a:lvl4pPr>
-            <a:lvl5pPr marL="1981200" indent="-228600" algn="l" rtl="0" eaLnBrk="1" fontAlgn="base" hangingPunct="1">
-              <a:spcBef>
-                <a:spcPct val="20000"/>
-              </a:spcBef>
-              <a:spcAft>
-                <a:spcPct val="0"/>
-              </a:spcAft>
-              <a:buClr>
-                <a:srgbClr val="008C5A"/>
-              </a:buClr>
-              <a:buFont typeface="Monotype Sorts" pitchFamily="2" charset="2"/>
-              <a:buChar char="l"/>
-              <a:defRPr sz="1600">
-                <a:solidFill>
-                  <a:schemeClr val="tx1"/>
-                </a:solidFill>
-                <a:latin typeface="+mn-lt"/>
-              </a:defRPr>
-            </a:lvl5pPr>
-            <a:lvl6pPr marL="2438400" indent="-228600" algn="l" rtl="0" eaLnBrk="1" fontAlgn="base" hangingPunct="1">
-              <a:spcBef>
-                <a:spcPct val="20000"/>
-              </a:spcBef>
-              <a:spcAft>
-                <a:spcPct val="0"/>
-              </a:spcAft>
-              <a:buClr>
-                <a:srgbClr val="008C5A"/>
-              </a:buClr>
-              <a:buFont typeface="Monotype Sorts" pitchFamily="2" charset="2"/>
-              <a:buChar char="l"/>
-              <a:defRPr sz="1600">
-                <a:solidFill>
-                  <a:schemeClr val="tx1"/>
-                </a:solidFill>
-                <a:latin typeface="+mn-lt"/>
-              </a:defRPr>
-            </a:lvl6pPr>
-            <a:lvl7pPr marL="2895600" indent="-228600" algn="l" rtl="0" eaLnBrk="1" fontAlgn="base" hangingPunct="1">
-              <a:spcBef>
-                <a:spcPct val="20000"/>
-              </a:spcBef>
-              <a:spcAft>
-                <a:spcPct val="0"/>
-              </a:spcAft>
-              <a:buClr>
-                <a:srgbClr val="008C5A"/>
-              </a:buClr>
-              <a:buFont typeface="Monotype Sorts" pitchFamily="2" charset="2"/>
-              <a:buChar char="l"/>
-              <a:defRPr sz="1600">
-                <a:solidFill>
-                  <a:schemeClr val="tx1"/>
-                </a:solidFill>
-                <a:latin typeface="+mn-lt"/>
-              </a:defRPr>
-            </a:lvl7pPr>
-            <a:lvl8pPr marL="3352800" indent="-228600" algn="l" rtl="0" eaLnBrk="1" fontAlgn="base" hangingPunct="1">
-              <a:spcBef>
-                <a:spcPct val="20000"/>
-              </a:spcBef>
-              <a:spcAft>
-                <a:spcPct val="0"/>
-              </a:spcAft>
-              <a:buClr>
-                <a:srgbClr val="008C5A"/>
-              </a:buClr>
-              <a:buFont typeface="Monotype Sorts" pitchFamily="2" charset="2"/>
-              <a:buChar char="l"/>
-              <a:defRPr sz="1600">
-                <a:solidFill>
-                  <a:schemeClr val="tx1"/>
-                </a:solidFill>
-                <a:latin typeface="+mn-lt"/>
-              </a:defRPr>
-            </a:lvl8pPr>
-            <a:lvl9pPr marL="3810000" indent="-228600" algn="l" rtl="0" eaLnBrk="1" fontAlgn="base" hangingPunct="1">
-              <a:spcBef>
-                <a:spcPct val="20000"/>
-              </a:spcBef>
-              <a:spcAft>
-                <a:spcPct val="0"/>
-              </a:spcAft>
-              <a:buClr>
-                <a:srgbClr val="008C5A"/>
-              </a:buClr>
-              <a:buFont typeface="Monotype Sorts" pitchFamily="2" charset="2"/>
-              <a:buChar char="l"/>
-              <a:defRPr sz="1600">
-                <a:solidFill>
-                  <a:schemeClr val="tx1"/>
-                </a:solidFill>
-                <a:latin typeface="+mn-lt"/>
-              </a:defRPr>
-            </a:lvl9pPr>
-          </a:lstStyle>
+            <a:r>
+              <a:rPr lang="de-DE" altLang="de-DE" kern="0" dirty="0"/>
+              <a:t>Aufwändige Implementierung</a:t>
+            </a:r>
+          </a:p>
           <a:p>
             <a:pPr>
               <a:buFont typeface="Arial" panose="020B0604020202020204" pitchFamily="34" charset="0"/>
@@ -3716,7 +3465,7 @@
             </a:pPr>
             <a:r>
               <a:rPr lang="de-DE" altLang="de-DE" kern="0" dirty="0"/>
-              <a:t>Aufwändige Implementierung</a:t>
+              <a:t>Teuer</a:t>
             </a:r>
           </a:p>
           <a:p>
@@ -3725,16 +3474,22 @@
               <a:buChar char="•"/>
             </a:pPr>
             <a:r>
-              <a:rPr lang="de-DE" altLang="de-DE" kern="0" dirty="0"/>
-              <a:t>Teuer</a:t>
-            </a:r>
+              <a:rPr lang="de-DE" dirty="0"/>
+              <a:t>Testgruppe nötig</a:t>
+            </a:r>
+          </a:p>
+          <a:p>
+            <a:pPr marL="0" indent="0">
+              <a:buNone/>
+            </a:pPr>
+            <a:endParaRPr lang="de-DE" dirty="0"/>
           </a:p>
         </p:txBody>
       </p:sp>
     </p:spTree>
     <p:extLst>
       <p:ext uri="{BB962C8B-B14F-4D97-AF65-F5344CB8AC3E}">
-        <p14:creationId xmlns:p14="http://schemas.microsoft.com/office/powerpoint/2010/main" val="1902602858"/>
+        <p14:creationId xmlns:p14="http://schemas.microsoft.com/office/powerpoint/2010/main" val="1813686431"/>
       </p:ext>
     </p:extLst>
   </p:cSld>
@@ -3812,14 +3567,32 @@
         </p:nvSpPr>
         <p:spPr>
           <a:xfrm>
-            <a:off x="303213" y="1844823"/>
-            <a:ext cx="8516937" cy="1296135"/>
+            <a:off x="303213" y="1268769"/>
+            <a:ext cx="8516937" cy="1990304"/>
           </a:xfrm>
         </p:spPr>
         <p:txBody>
           <a:bodyPr/>
           <a:lstStyle/>
           <a:p>
+            <a:pPr marL="0" indent="0">
+              <a:buNone/>
+            </a:pPr>
+            <a:r>
+              <a:rPr lang="de-DE" sz="2400" b="1" dirty="0">
+                <a:latin typeface="+mj-lt"/>
+              </a:rPr>
+              <a:t>Shadow </a:t>
+            </a:r>
+            <a:r>
+              <a:rPr lang="de-DE" sz="2400" b="1" dirty="0" err="1">
+                <a:latin typeface="+mj-lt"/>
+              </a:rPr>
+              <a:t>Deployment</a:t>
+            </a:r>
+            <a:endParaRPr lang="de-DE" b="1" dirty="0"/>
+          </a:p>
+          <a:p>
             <a:pPr>
               <a:buFont typeface="Arial" panose="020B0604020202020204" pitchFamily="34" charset="0"/>
               <a:buChar char="•"/>
@@ -3860,59 +3633,6 @@
               <a:buChar char="•"/>
             </a:pPr>
             <a:endParaRPr lang="de-DE" dirty="0"/>
-          </a:p>
-        </p:txBody>
-      </p:sp>
-      <p:sp>
-        <p:nvSpPr>
-          <p:cNvPr id="5" name="Textfeld 4">
-            <a:extLst>
-              <a:ext uri="{FF2B5EF4-FFF2-40B4-BE49-F238E27FC236}">
-                <a16:creationId xmlns:a16="http://schemas.microsoft.com/office/drawing/2014/main" id="{2329921C-13DB-F6B8-C326-D9583581E977}"/>
-              </a:ext>
-            </a:extLst>
-          </p:cNvPr>
-          <p:cNvSpPr txBox="1"/>
-          <p:nvPr/>
-        </p:nvSpPr>
-        <p:spPr bwMode="auto">
-          <a:xfrm>
-            <a:off x="330324" y="1079972"/>
-            <a:ext cx="8462714" cy="584775"/>
-          </a:xfrm>
-          <a:prstGeom prst="rect">
-            <a:avLst/>
-          </a:prstGeom>
-          <a:noFill/>
-          <a:ln w="9525">
-            <a:noFill/>
-            <a:miter lim="800000"/>
-            <a:headEnd/>
-            <a:tailEnd/>
-          </a:ln>
-        </p:spPr>
-        <p:txBody>
-          <a:bodyPr wrap="square" rtlCol="0" anchor="ctr">
-            <a:spAutoFit/>
-          </a:bodyPr>
-          <a:lstStyle/>
-          <a:p>
-            <a:pPr algn="ctr" eaLnBrk="1" hangingPunct="1"/>
-            <a:r>
-              <a:rPr lang="de-DE" sz="3200" dirty="0">
-                <a:latin typeface="+mj-lt"/>
-              </a:rPr>
-              <a:t>Shadow </a:t>
-            </a:r>
-            <a:r>
-              <a:rPr lang="de-DE" sz="3200" dirty="0" err="1">
-                <a:latin typeface="+mj-lt"/>
-              </a:rPr>
-              <a:t>Deploment</a:t>
-            </a:r>
-            <a:endParaRPr lang="de-DE" sz="3200" dirty="0">
-              <a:latin typeface="+mj-lt"/>
-            </a:endParaRPr>
           </a:p>
         </p:txBody>
       </p:sp>
@@ -5088,7 +4808,7 @@
           <p:cNvPr id="2" name="Titel 1">
             <a:extLst>
               <a:ext uri="{FF2B5EF4-FFF2-40B4-BE49-F238E27FC236}">
-                <a16:creationId xmlns:a16="http://schemas.microsoft.com/office/drawing/2014/main" id="{D99BAD01-A920-7F80-9D35-9B44F14A75EF}"/>
+                <a16:creationId xmlns:a16="http://schemas.microsoft.com/office/drawing/2014/main" id="{ED7C349D-0E7A-EEE6-70A2-FB3361269E62}"/>
               </a:ext>
             </a:extLst>
           </p:cNvPr>
@@ -5118,54 +4838,10 @@
       </p:sp>
       <p:sp>
         <p:nvSpPr>
-          <p:cNvPr id="5" name="Textfeld 4">
-            <a:extLst>
-              <a:ext uri="{FF2B5EF4-FFF2-40B4-BE49-F238E27FC236}">
-                <a16:creationId xmlns:a16="http://schemas.microsoft.com/office/drawing/2014/main" id="{B391B747-BBA4-21F1-3683-E6C2DC8AA3C6}"/>
-              </a:ext>
-            </a:extLst>
-          </p:cNvPr>
-          <p:cNvSpPr txBox="1"/>
-          <p:nvPr/>
-        </p:nvSpPr>
-        <p:spPr bwMode="auto">
-          <a:xfrm>
-            <a:off x="330324" y="1079972"/>
-            <a:ext cx="8462714" cy="584775"/>
-          </a:xfrm>
-          <a:prstGeom prst="rect">
-            <a:avLst/>
-          </a:prstGeom>
-          <a:noFill/>
-          <a:ln w="9525">
-            <a:noFill/>
-            <a:miter lim="800000"/>
-            <a:headEnd/>
-            <a:tailEnd/>
-          </a:ln>
-        </p:spPr>
-        <p:txBody>
-          <a:bodyPr wrap="square" rtlCol="0" anchor="ctr">
-            <a:spAutoFit/>
-          </a:bodyPr>
-          <a:lstStyle/>
-          <a:p>
-            <a:pPr algn="ctr" eaLnBrk="1" hangingPunct="1"/>
-            <a:r>
-              <a:rPr lang="de-DE" sz="3200" dirty="0">
-                <a:latin typeface="+mj-lt"/>
-              </a:rPr>
-              <a:t>Vor und Nachteile</a:t>
-            </a:r>
-          </a:p>
-        </p:txBody>
-      </p:sp>
-      <p:sp>
-        <p:nvSpPr>
           <p:cNvPr id="3" name="Inhaltsplatzhalter 2">
             <a:extLst>
               <a:ext uri="{FF2B5EF4-FFF2-40B4-BE49-F238E27FC236}">
-                <a16:creationId xmlns:a16="http://schemas.microsoft.com/office/drawing/2014/main" id="{B3231207-F7BC-F792-92B9-48E8C8E01816}"/>
+                <a16:creationId xmlns:a16="http://schemas.microsoft.com/office/drawing/2014/main" id="{A30E689A-D887-FBDB-5FD7-0DF3BFC02D5D}"/>
               </a:ext>
             </a:extLst>
           </p:cNvPr>
@@ -5176,16 +4852,20 @@
             <p:ph idx="1"/>
           </p:nvPr>
         </p:nvSpPr>
-        <p:spPr>
-          <a:xfrm>
-            <a:off x="683568" y="1988840"/>
-            <a:ext cx="3764731" cy="3960440"/>
-          </a:xfrm>
-        </p:spPr>
+        <p:spPr/>
         <p:txBody>
           <a:bodyPr/>
           <a:lstStyle/>
           <a:p>
+            <a:pPr marL="0" indent="0">
+              <a:buNone/>
+            </a:pPr>
+            <a:r>
+              <a:rPr lang="de-DE" b="1" dirty="0"/>
+              <a:t>Vorteile</a:t>
+            </a:r>
+          </a:p>
+          <a:p>
             <a:pPr>
               <a:buFont typeface="Arial" panose="020B0604020202020204" pitchFamily="34" charset="0"/>
               <a:buChar char="•"/>
@@ -5215,235 +4895,21 @@
               <a:t>Test unter Volllast</a:t>
             </a:r>
           </a:p>
-        </p:txBody>
-      </p:sp>
-      <p:sp>
-        <p:nvSpPr>
-          <p:cNvPr id="4" name="Inhaltsplatzhalter 2">
-            <a:extLst>
-              <a:ext uri="{FF2B5EF4-FFF2-40B4-BE49-F238E27FC236}">
-                <a16:creationId xmlns:a16="http://schemas.microsoft.com/office/drawing/2014/main" id="{0EDA6666-E721-7B60-2CB5-59117D00AFAA}"/>
-              </a:ext>
-            </a:extLst>
-          </p:cNvPr>
-          <p:cNvSpPr txBox="1">
-            <a:spLocks/>
-          </p:cNvSpPr>
-          <p:nvPr/>
-        </p:nvSpPr>
-        <p:spPr bwMode="auto">
-          <a:xfrm>
-            <a:off x="4693773" y="1988840"/>
-            <a:ext cx="3764731" cy="3960440"/>
-          </a:xfrm>
-          <a:prstGeom prst="rect">
-            <a:avLst/>
-          </a:prstGeom>
-          <a:noFill/>
-          <a:ln>
-            <a:noFill/>
-          </a:ln>
-          <a:extLst>
-            <a:ext uri="{909E8E84-426E-40DD-AFC4-6F175D3DCCD1}">
-              <a14:hiddenFill xmlns:a14="http://schemas.microsoft.com/office/drawing/2010/main">
-                <a:solidFill>
-                  <a:srgbClr val="FFFFFF"/>
-                </a:solidFill>
-              </a14:hiddenFill>
-            </a:ext>
-            <a:ext uri="{91240B29-F687-4F45-9708-019B960494DF}">
-              <a14:hiddenLine xmlns:a14="http://schemas.microsoft.com/office/drawing/2010/main" w="9525">
-                <a:solidFill>
-                  <a:srgbClr val="000000"/>
-                </a:solidFill>
-                <a:miter lim="800000"/>
-                <a:headEnd/>
-                <a:tailEnd/>
-              </a14:hiddenLine>
-            </a:ext>
-          </a:extLst>
-        </p:spPr>
-        <p:txBody>
-          <a:bodyPr vert="horz" wrap="square" lIns="92075" tIns="46038" rIns="92075" bIns="46038" numCol="1" anchor="t" anchorCtr="0" compatLnSpc="1">
-            <a:prstTxWarp prst="textNoShape">
-              <a:avLst/>
-            </a:prstTxWarp>
-          </a:bodyPr>
-          <a:lstStyle>
-            <a:lvl1pPr marL="342900" indent="-342900" algn="l" rtl="0" eaLnBrk="1" fontAlgn="base" hangingPunct="1">
-              <a:spcBef>
-                <a:spcPct val="20000"/>
-              </a:spcBef>
-              <a:spcAft>
-                <a:spcPct val="0"/>
-              </a:spcAft>
-              <a:buClr>
-                <a:srgbClr val="008C5A"/>
-              </a:buClr>
-              <a:buFont typeface="Monotype Sorts" pitchFamily="2" charset="2"/>
-              <a:buChar char="l"/>
-              <a:defRPr sz="2400">
-                <a:solidFill>
-                  <a:schemeClr val="tx1"/>
-                </a:solidFill>
-                <a:latin typeface="+mn-lt"/>
-                <a:ea typeface="+mn-ea"/>
-                <a:cs typeface="+mn-cs"/>
-              </a:defRPr>
-            </a:lvl1pPr>
-            <a:lvl2pPr marL="742950" indent="-285750" algn="l" rtl="0" eaLnBrk="1" fontAlgn="base" hangingPunct="1">
-              <a:spcBef>
-                <a:spcPct val="20000"/>
-              </a:spcBef>
-              <a:spcAft>
-                <a:spcPct val="0"/>
-              </a:spcAft>
-              <a:buClr>
-                <a:srgbClr val="008C5A"/>
-              </a:buClr>
-              <a:buFont typeface="Monotype Sorts" pitchFamily="2" charset="2"/>
-              <a:buChar char="l"/>
-              <a:defRPr sz="2000">
-                <a:solidFill>
-                  <a:schemeClr val="tx1"/>
-                </a:solidFill>
-                <a:latin typeface="+mn-lt"/>
-              </a:defRPr>
-            </a:lvl2pPr>
-            <a:lvl3pPr marL="1143000" indent="-228600" algn="l" rtl="0" eaLnBrk="1" fontAlgn="base" hangingPunct="1">
-              <a:spcBef>
-                <a:spcPct val="20000"/>
-              </a:spcBef>
-              <a:spcAft>
-                <a:spcPct val="0"/>
-              </a:spcAft>
-              <a:buClr>
-                <a:srgbClr val="008C5A"/>
-              </a:buClr>
-              <a:buFont typeface="Monotype Sorts" pitchFamily="2" charset="2"/>
-              <a:buChar char="l"/>
-              <a:defRPr sz="2400">
-                <a:solidFill>
-                  <a:schemeClr val="tx1"/>
-                </a:solidFill>
-                <a:latin typeface="+mn-lt"/>
-              </a:defRPr>
-            </a:lvl3pPr>
-            <a:lvl4pPr marL="1562100" indent="-228600" algn="l" rtl="0" eaLnBrk="1" fontAlgn="base" hangingPunct="1">
-              <a:spcBef>
-                <a:spcPct val="20000"/>
-              </a:spcBef>
-              <a:spcAft>
-                <a:spcPct val="0"/>
-              </a:spcAft>
-              <a:buClr>
-                <a:srgbClr val="008C5A"/>
-              </a:buClr>
-              <a:buFont typeface="Monotype Sorts" pitchFamily="2" charset="2"/>
-              <a:buChar char="l"/>
-              <a:defRPr sz="1600">
-                <a:solidFill>
-                  <a:schemeClr val="tx1"/>
-                </a:solidFill>
-                <a:latin typeface="+mn-lt"/>
-              </a:defRPr>
-            </a:lvl4pPr>
-            <a:lvl5pPr marL="1981200" indent="-228600" algn="l" rtl="0" eaLnBrk="1" fontAlgn="base" hangingPunct="1">
-              <a:spcBef>
-                <a:spcPct val="20000"/>
-              </a:spcBef>
-              <a:spcAft>
-                <a:spcPct val="0"/>
-              </a:spcAft>
-              <a:buClr>
-                <a:srgbClr val="008C5A"/>
-              </a:buClr>
-              <a:buFont typeface="Monotype Sorts" pitchFamily="2" charset="2"/>
-              <a:buChar char="l"/>
-              <a:defRPr sz="1600">
-                <a:solidFill>
-                  <a:schemeClr val="tx1"/>
-                </a:solidFill>
-                <a:latin typeface="+mn-lt"/>
-              </a:defRPr>
-            </a:lvl5pPr>
-            <a:lvl6pPr marL="2438400" indent="-228600" algn="l" rtl="0" eaLnBrk="1" fontAlgn="base" hangingPunct="1">
-              <a:spcBef>
-                <a:spcPct val="20000"/>
-              </a:spcBef>
-              <a:spcAft>
-                <a:spcPct val="0"/>
-              </a:spcAft>
-              <a:buClr>
-                <a:srgbClr val="008C5A"/>
-              </a:buClr>
-              <a:buFont typeface="Monotype Sorts" pitchFamily="2" charset="2"/>
-              <a:buChar char="l"/>
-              <a:defRPr sz="1600">
-                <a:solidFill>
-                  <a:schemeClr val="tx1"/>
-                </a:solidFill>
-                <a:latin typeface="+mn-lt"/>
-              </a:defRPr>
-            </a:lvl6pPr>
-            <a:lvl7pPr marL="2895600" indent="-228600" algn="l" rtl="0" eaLnBrk="1" fontAlgn="base" hangingPunct="1">
-              <a:spcBef>
-                <a:spcPct val="20000"/>
-              </a:spcBef>
-              <a:spcAft>
-                <a:spcPct val="0"/>
-              </a:spcAft>
-              <a:buClr>
-                <a:srgbClr val="008C5A"/>
-              </a:buClr>
-              <a:buFont typeface="Monotype Sorts" pitchFamily="2" charset="2"/>
-              <a:buChar char="l"/>
-              <a:defRPr sz="1600">
-                <a:solidFill>
-                  <a:schemeClr val="tx1"/>
-                </a:solidFill>
-                <a:latin typeface="+mn-lt"/>
-              </a:defRPr>
-            </a:lvl7pPr>
-            <a:lvl8pPr marL="3352800" indent="-228600" algn="l" rtl="0" eaLnBrk="1" fontAlgn="base" hangingPunct="1">
-              <a:spcBef>
-                <a:spcPct val="20000"/>
-              </a:spcBef>
-              <a:spcAft>
-                <a:spcPct val="0"/>
-              </a:spcAft>
-              <a:buClr>
-                <a:srgbClr val="008C5A"/>
-              </a:buClr>
-              <a:buFont typeface="Monotype Sorts" pitchFamily="2" charset="2"/>
-              <a:buChar char="l"/>
-              <a:defRPr sz="1600">
-                <a:solidFill>
-                  <a:schemeClr val="tx1"/>
-                </a:solidFill>
-                <a:latin typeface="+mn-lt"/>
-              </a:defRPr>
-            </a:lvl8pPr>
-            <a:lvl9pPr marL="3810000" indent="-228600" algn="l" rtl="0" eaLnBrk="1" fontAlgn="base" hangingPunct="1">
-              <a:spcBef>
-                <a:spcPct val="20000"/>
-              </a:spcBef>
-              <a:spcAft>
-                <a:spcPct val="0"/>
-              </a:spcAft>
-              <a:buClr>
-                <a:srgbClr val="008C5A"/>
-              </a:buClr>
-              <a:buFont typeface="Monotype Sorts" pitchFamily="2" charset="2"/>
-              <a:buChar char="l"/>
-              <a:defRPr sz="1600">
-                <a:solidFill>
-                  <a:schemeClr val="tx1"/>
-                </a:solidFill>
-                <a:latin typeface="+mn-lt"/>
-              </a:defRPr>
-            </a:lvl9pPr>
-          </a:lstStyle>
+          <a:p>
+            <a:pPr marL="0" indent="0">
+              <a:buNone/>
+            </a:pPr>
+            <a:endParaRPr lang="de-DE" b="1" dirty="0"/>
+          </a:p>
+          <a:p>
+            <a:pPr marL="0" indent="0">
+              <a:buNone/>
+            </a:pPr>
+            <a:r>
+              <a:rPr lang="de-DE" b="1" dirty="0"/>
+              <a:t>Nachteile</a:t>
+            </a:r>
+          </a:p>
           <a:p>
             <a:pPr>
               <a:buFont typeface="Arial" panose="020B0604020202020204" pitchFamily="34" charset="0"/>
@@ -5473,13 +4939,19 @@
               <a:rPr lang="de-DE" altLang="de-DE" kern="0" dirty="0"/>
               <a:t>Nur Test kein Update</a:t>
             </a:r>
+          </a:p>
+          <a:p>
+            <a:pPr marL="0" indent="0">
+              <a:buNone/>
+            </a:pPr>
+            <a:endParaRPr lang="de-DE" b="1" dirty="0"/>
           </a:p>
         </p:txBody>
       </p:sp>
     </p:spTree>
     <p:extLst>
       <p:ext uri="{BB962C8B-B14F-4D97-AF65-F5344CB8AC3E}">
-        <p14:creationId xmlns:p14="http://schemas.microsoft.com/office/powerpoint/2010/main" val="118415372"/>
+        <p14:creationId xmlns:p14="http://schemas.microsoft.com/office/powerpoint/2010/main" val="1580441489"/>
       </p:ext>
     </p:extLst>
   </p:cSld>
@@ -5562,14 +5034,44 @@
         </p:nvSpPr>
         <p:spPr>
           <a:xfrm>
-            <a:off x="303213" y="1916832"/>
-            <a:ext cx="8516937" cy="1413470"/>
+            <a:off x="303213" y="1223442"/>
+            <a:ext cx="8516937" cy="1845518"/>
           </a:xfrm>
         </p:spPr>
         <p:txBody>
           <a:bodyPr/>
           <a:lstStyle/>
           <a:p>
+            <a:pPr marL="0" indent="0">
+              <a:buNone/>
+            </a:pPr>
+            <a:r>
+              <a:rPr lang="en-US" sz="2400" b="1" dirty="0" err="1">
+                <a:latin typeface="+mj-lt"/>
+              </a:rPr>
+              <a:t>Depl</a:t>
+            </a:r>
+            <a:r>
+              <a:rPr lang="de-DE" sz="2400" b="1" dirty="0" err="1">
+                <a:latin typeface="+mj-lt"/>
+              </a:rPr>
+              <a:t>oyment</a:t>
+            </a:r>
+            <a:r>
+              <a:rPr lang="de-DE" sz="2400" b="1" dirty="0">
+                <a:latin typeface="+mj-lt"/>
+              </a:rPr>
+              <a:t> mit </a:t>
+            </a:r>
+            <a:r>
+              <a:rPr lang="de-DE" sz="2400" b="1" dirty="0" err="1">
+                <a:latin typeface="+mj-lt"/>
+              </a:rPr>
+              <a:t>Gitlabs</a:t>
+            </a:r>
+            <a:endParaRPr lang="de-DE" altLang="de-DE" b="1" dirty="0"/>
+          </a:p>
+          <a:p>
             <a:pPr>
               <a:buFont typeface="Arial" panose="020B0604020202020204" pitchFamily="34" charset="0"/>
               <a:buChar char="•"/>
@@ -5598,71 +5100,6 @@
               <a:rPr lang="de-DE" altLang="de-DE" dirty="0"/>
               <a:t>Fast jeder Workflow</a:t>
             </a:r>
-          </a:p>
-        </p:txBody>
-      </p:sp>
-      <p:sp>
-        <p:nvSpPr>
-          <p:cNvPr id="2" name="Textfeld 1">
-            <a:extLst>
-              <a:ext uri="{FF2B5EF4-FFF2-40B4-BE49-F238E27FC236}">
-                <a16:creationId xmlns:a16="http://schemas.microsoft.com/office/drawing/2014/main" id="{48052CC9-2A6B-52A9-F7D1-AFAA2971A0E7}"/>
-              </a:ext>
-            </a:extLst>
-          </p:cNvPr>
-          <p:cNvSpPr txBox="1"/>
-          <p:nvPr/>
-        </p:nvSpPr>
-        <p:spPr bwMode="auto">
-          <a:xfrm>
-            <a:off x="330324" y="1079972"/>
-            <a:ext cx="8462714" cy="584775"/>
-          </a:xfrm>
-          <a:prstGeom prst="rect">
-            <a:avLst/>
-          </a:prstGeom>
-          <a:noFill/>
-          <a:ln w="9525">
-            <a:noFill/>
-            <a:miter lim="800000"/>
-            <a:headEnd/>
-            <a:tailEnd/>
-          </a:ln>
-        </p:spPr>
-        <p:txBody>
-          <a:bodyPr wrap="square" rtlCol="0" anchor="ctr">
-            <a:spAutoFit/>
-          </a:bodyPr>
-          <a:lstStyle/>
-          <a:p>
-            <a:pPr algn="ctr" eaLnBrk="1" hangingPunct="1"/>
-            <a:r>
-              <a:rPr lang="en-US" sz="3200" dirty="0" err="1">
-                <a:latin typeface="+mj-lt"/>
-              </a:rPr>
-              <a:t>Depl</a:t>
-            </a:r>
-            <a:r>
-              <a:rPr lang="de-DE" sz="3200" dirty="0" err="1">
-                <a:latin typeface="+mj-lt"/>
-              </a:rPr>
-              <a:t>oyment</a:t>
-            </a:r>
-            <a:r>
-              <a:rPr lang="de-DE" sz="3200" dirty="0">
-                <a:latin typeface="+mj-lt"/>
-              </a:rPr>
-              <a:t> mit </a:t>
-            </a:r>
-            <a:r>
-              <a:rPr lang="de-DE" sz="3200" dirty="0" err="1">
-                <a:latin typeface="+mj-lt"/>
-              </a:rPr>
-              <a:t>Gitlabs</a:t>
-            </a:r>
-            <a:endParaRPr lang="de-DE" sz="3200" dirty="0">
-              <a:latin typeface="+mj-lt"/>
-            </a:endParaRPr>
           </a:p>
         </p:txBody>
       </p:sp>
@@ -5694,7 +5131,7 @@
         </p:blipFill>
         <p:spPr>
           <a:xfrm>
-            <a:off x="270423" y="4338413"/>
+            <a:off x="270423" y="4050381"/>
             <a:ext cx="2141337" cy="1970908"/>
           </a:xfrm>
           <a:prstGeom prst="rect">
@@ -5716,7 +5153,7 @@
         </p:nvSpPr>
         <p:spPr bwMode="auto">
           <a:xfrm>
-            <a:off x="3851920" y="4149080"/>
+            <a:off x="3851920" y="3861048"/>
             <a:ext cx="2141337" cy="2160241"/>
           </a:xfrm>
           <a:prstGeom prst="rect">
@@ -5787,7 +5224,7 @@
         </p:nvSpPr>
         <p:spPr bwMode="auto">
           <a:xfrm>
-            <a:off x="3995936" y="4293097"/>
+            <a:off x="3995936" y="4005065"/>
             <a:ext cx="1844477" cy="864095"/>
           </a:xfrm>
           <a:prstGeom prst="rect">
@@ -5861,7 +5298,7 @@
         </p:nvSpPr>
         <p:spPr bwMode="auto">
           <a:xfrm>
-            <a:off x="4499992" y="5445224"/>
+            <a:off x="4499992" y="5157192"/>
             <a:ext cx="864096" cy="720080"/>
           </a:xfrm>
           <a:prstGeom prst="flowChartMagneticDisk">
@@ -5935,7 +5372,7 @@
         </p:nvSpPr>
         <p:spPr bwMode="auto">
           <a:xfrm>
-            <a:off x="6751143" y="4149080"/>
+            <a:off x="6751143" y="3861048"/>
             <a:ext cx="2141337" cy="2160241"/>
           </a:xfrm>
           <a:prstGeom prst="rect">
@@ -6006,7 +5443,7 @@
         </p:nvSpPr>
         <p:spPr bwMode="auto">
           <a:xfrm>
-            <a:off x="6895159" y="4293097"/>
+            <a:off x="6895159" y="4005065"/>
             <a:ext cx="1844477" cy="864095"/>
           </a:xfrm>
           <a:prstGeom prst="rect">
@@ -6090,7 +5527,7 @@
         </p:nvSpPr>
         <p:spPr bwMode="auto">
           <a:xfrm>
-            <a:off x="7399215" y="5445224"/>
+            <a:off x="7399215" y="5157192"/>
             <a:ext cx="864096" cy="720080"/>
           </a:xfrm>
           <a:prstGeom prst="flowChartMagneticDisk">
@@ -6168,7 +5605,7 @@
         </p:nvCxnSpPr>
         <p:spPr bwMode="auto">
           <a:xfrm rot="5400000" flipH="1" flipV="1">
-            <a:off x="3037174" y="2452999"/>
+            <a:off x="3037174" y="2164967"/>
             <a:ext cx="189333" cy="3581497"/>
           </a:xfrm>
           <a:prstGeom prst="bentConnector3">
@@ -6209,7 +5646,7 @@
         </p:nvCxnSpPr>
         <p:spPr bwMode="auto">
           <a:xfrm rot="5400000" flipH="1" flipV="1">
-            <a:off x="4486786" y="1003387"/>
+            <a:off x="4486786" y="715355"/>
             <a:ext cx="189333" cy="6480720"/>
           </a:xfrm>
           <a:prstGeom prst="bentConnector3">
@@ -6308,7 +5745,7 @@
         </p:nvSpPr>
         <p:spPr>
           <a:xfrm>
-            <a:off x="303213" y="1887487"/>
+            <a:off x="303213" y="1268760"/>
             <a:ext cx="8516937" cy="4494263"/>
           </a:xfrm>
         </p:spPr>
@@ -6316,6 +5753,30 @@
           <a:bodyPr/>
           <a:lstStyle/>
           <a:p>
+            <a:pPr marL="0" indent="0">
+              <a:buNone/>
+            </a:pPr>
+            <a:r>
+              <a:rPr lang="de-DE" sz="2400" b="1" dirty="0">
+                <a:latin typeface="+mj-lt"/>
+              </a:rPr>
+              <a:t>Verschiedene </a:t>
+            </a:r>
+            <a:r>
+              <a:rPr lang="de-DE" sz="2400" b="1" dirty="0" err="1">
+                <a:latin typeface="+mj-lt"/>
+              </a:rPr>
+              <a:t>Deployment</a:t>
+            </a:r>
+            <a:r>
+              <a:rPr lang="de-DE" sz="2400" b="1" dirty="0">
+                <a:latin typeface="+mj-lt"/>
+              </a:rPr>
+              <a:t> Strategien</a:t>
+            </a:r>
+            <a:endParaRPr lang="de-DE" b="1" dirty="0"/>
+          </a:p>
+          <a:p>
             <a:pPr>
               <a:buFont typeface="Arial" panose="020B0604020202020204" pitchFamily="34" charset="0"/>
               <a:buChar char="•"/>
@@ -6378,62 +5839,6 @@
               <a:t>Deployment</a:t>
             </a:r>
             <a:endParaRPr lang="de-DE" dirty="0"/>
-          </a:p>
-        </p:txBody>
-      </p:sp>
-      <p:sp>
-        <p:nvSpPr>
-          <p:cNvPr id="4" name="Textfeld 3">
-            <a:extLst>
-              <a:ext uri="{FF2B5EF4-FFF2-40B4-BE49-F238E27FC236}">
-                <a16:creationId xmlns:a16="http://schemas.microsoft.com/office/drawing/2014/main" id="{CDC265E2-64EC-6E98-0426-B7D891263531}"/>
-              </a:ext>
-            </a:extLst>
-          </p:cNvPr>
-          <p:cNvSpPr txBox="1"/>
-          <p:nvPr/>
-        </p:nvSpPr>
-        <p:spPr bwMode="auto">
-          <a:xfrm>
-            <a:off x="330324" y="1079972"/>
-            <a:ext cx="8462714" cy="584775"/>
-          </a:xfrm>
-          <a:prstGeom prst="rect">
-            <a:avLst/>
-          </a:prstGeom>
-          <a:noFill/>
-          <a:ln w="9525">
-            <a:noFill/>
-            <a:miter lim="800000"/>
-            <a:headEnd/>
-            <a:tailEnd/>
-          </a:ln>
-        </p:spPr>
-        <p:txBody>
-          <a:bodyPr wrap="square" rtlCol="0" anchor="ctr">
-            <a:spAutoFit/>
-          </a:bodyPr>
-          <a:lstStyle/>
-          <a:p>
-            <a:pPr algn="ctr" eaLnBrk="1" hangingPunct="1"/>
-            <a:r>
-              <a:rPr lang="de-DE" sz="3200" dirty="0">
-                <a:latin typeface="+mj-lt"/>
-              </a:rPr>
-              <a:t>Verschiedene </a:t>
-            </a:r>
-            <a:r>
-              <a:rPr lang="de-DE" sz="3200" dirty="0" err="1">
-                <a:latin typeface="+mj-lt"/>
-              </a:rPr>
-              <a:t>Deployment</a:t>
-            </a:r>
-            <a:r>
-              <a:rPr lang="de-DE" sz="3200" dirty="0">
-                <a:latin typeface="+mj-lt"/>
-              </a:rPr>
-              <a:t> Strategien</a:t>
-            </a:r>
           </a:p>
         </p:txBody>
       </p:sp>
@@ -6518,14 +5923,38 @@
         </p:nvSpPr>
         <p:spPr>
           <a:xfrm>
-            <a:off x="303213" y="1844824"/>
-            <a:ext cx="8516937" cy="1080120"/>
+            <a:off x="303213" y="1268759"/>
+            <a:ext cx="8516937" cy="1728191"/>
           </a:xfrm>
         </p:spPr>
         <p:txBody>
           <a:bodyPr/>
           <a:lstStyle/>
           <a:p>
+            <a:pPr marL="0" indent="0">
+              <a:buNone/>
+            </a:pPr>
+            <a:r>
+              <a:rPr lang="de-DE" sz="2400" b="1" dirty="0" err="1">
+                <a:latin typeface="+mj-lt"/>
+              </a:rPr>
+              <a:t>Recreate</a:t>
+            </a:r>
+            <a:r>
+              <a:rPr lang="de-DE" sz="2400" b="1" dirty="0">
+                <a:latin typeface="+mj-lt"/>
+              </a:rPr>
+              <a:t> </a:t>
+            </a:r>
+            <a:r>
+              <a:rPr lang="de-DE" sz="2400" b="1" dirty="0" err="1">
+                <a:latin typeface="+mj-lt"/>
+              </a:rPr>
+              <a:t>Deployment</a:t>
+            </a:r>
+            <a:endParaRPr lang="de-DE" b="1" dirty="0"/>
+          </a:p>
+          <a:p>
             <a:pPr>
               <a:buFont typeface="Arial" panose="020B0604020202020204" pitchFamily="34" charset="0"/>
               <a:buChar char="•"/>
@@ -6559,65 +5988,6 @@
               <a:buChar char="•"/>
             </a:pPr>
             <a:endParaRPr lang="de-DE" dirty="0"/>
-          </a:p>
-        </p:txBody>
-      </p:sp>
-      <p:sp>
-        <p:nvSpPr>
-          <p:cNvPr id="5" name="Textfeld 4">
-            <a:extLst>
-              <a:ext uri="{FF2B5EF4-FFF2-40B4-BE49-F238E27FC236}">
-                <a16:creationId xmlns:a16="http://schemas.microsoft.com/office/drawing/2014/main" id="{2329921C-13DB-F6B8-C326-D9583581E977}"/>
-              </a:ext>
-            </a:extLst>
-          </p:cNvPr>
-          <p:cNvSpPr txBox="1"/>
-          <p:nvPr/>
-        </p:nvSpPr>
-        <p:spPr bwMode="auto">
-          <a:xfrm>
-            <a:off x="330324" y="1079972"/>
-            <a:ext cx="8462714" cy="584775"/>
-          </a:xfrm>
-          <a:prstGeom prst="rect">
-            <a:avLst/>
-          </a:prstGeom>
-          <a:noFill/>
-          <a:ln w="9525">
-            <a:noFill/>
-            <a:miter lim="800000"/>
-            <a:headEnd/>
-            <a:tailEnd/>
-          </a:ln>
-        </p:spPr>
-        <p:txBody>
-          <a:bodyPr wrap="square" rtlCol="0" anchor="ctr">
-            <a:spAutoFit/>
-          </a:bodyPr>
-          <a:lstStyle/>
-          <a:p>
-            <a:pPr algn="ctr" eaLnBrk="1" hangingPunct="1"/>
-            <a:r>
-              <a:rPr lang="de-DE" sz="3200" dirty="0" err="1">
-                <a:latin typeface="+mj-lt"/>
-              </a:rPr>
-              <a:t>Recreate</a:t>
-            </a:r>
-            <a:r>
-              <a:rPr lang="de-DE" sz="3200" dirty="0">
-                <a:latin typeface="+mj-lt"/>
-              </a:rPr>
-              <a:t> </a:t>
-            </a:r>
-            <a:r>
-              <a:rPr lang="de-DE" sz="3200" dirty="0" err="1">
-                <a:latin typeface="+mj-lt"/>
-              </a:rPr>
-              <a:t>Deployment</a:t>
-            </a:r>
-            <a:endParaRPr lang="de-DE" sz="3200" dirty="0">
-              <a:latin typeface="+mj-lt"/>
-            </a:endParaRPr>
           </a:p>
         </p:txBody>
       </p:sp>
@@ -7286,7 +6656,7 @@
           <p:cNvPr id="2" name="Titel 1">
             <a:extLst>
               <a:ext uri="{FF2B5EF4-FFF2-40B4-BE49-F238E27FC236}">
-                <a16:creationId xmlns:a16="http://schemas.microsoft.com/office/drawing/2014/main" id="{D99BAD01-A920-7F80-9D35-9B44F14A75EF}"/>
+                <a16:creationId xmlns:a16="http://schemas.microsoft.com/office/drawing/2014/main" id="{80BF4B68-F404-4DA6-CCFF-19FBA248EFD8}"/>
               </a:ext>
             </a:extLst>
           </p:cNvPr>
@@ -7316,54 +6686,10 @@
       </p:sp>
       <p:sp>
         <p:nvSpPr>
-          <p:cNvPr id="5" name="Textfeld 4">
-            <a:extLst>
-              <a:ext uri="{FF2B5EF4-FFF2-40B4-BE49-F238E27FC236}">
-                <a16:creationId xmlns:a16="http://schemas.microsoft.com/office/drawing/2014/main" id="{B391B747-BBA4-21F1-3683-E6C2DC8AA3C6}"/>
-              </a:ext>
-            </a:extLst>
-          </p:cNvPr>
-          <p:cNvSpPr txBox="1"/>
-          <p:nvPr/>
-        </p:nvSpPr>
-        <p:spPr bwMode="auto">
-          <a:xfrm>
-            <a:off x="330324" y="1079972"/>
-            <a:ext cx="8462714" cy="584775"/>
-          </a:xfrm>
-          <a:prstGeom prst="rect">
-            <a:avLst/>
-          </a:prstGeom>
-          <a:noFill/>
-          <a:ln w="9525">
-            <a:noFill/>
-            <a:miter lim="800000"/>
-            <a:headEnd/>
-            <a:tailEnd/>
-          </a:ln>
-        </p:spPr>
-        <p:txBody>
-          <a:bodyPr wrap="square" rtlCol="0" anchor="ctr">
-            <a:spAutoFit/>
-          </a:bodyPr>
-          <a:lstStyle/>
-          <a:p>
-            <a:pPr algn="ctr" eaLnBrk="1" hangingPunct="1"/>
-            <a:r>
-              <a:rPr lang="de-DE" sz="3200" dirty="0">
-                <a:latin typeface="+mj-lt"/>
-              </a:rPr>
-              <a:t>Vor und Nachteile</a:t>
-            </a:r>
-          </a:p>
-        </p:txBody>
-      </p:sp>
-      <p:sp>
-        <p:nvSpPr>
           <p:cNvPr id="3" name="Inhaltsplatzhalter 2">
             <a:extLst>
               <a:ext uri="{FF2B5EF4-FFF2-40B4-BE49-F238E27FC236}">
-                <a16:creationId xmlns:a16="http://schemas.microsoft.com/office/drawing/2014/main" id="{B3231207-F7BC-F792-92B9-48E8C8E01816}"/>
+                <a16:creationId xmlns:a16="http://schemas.microsoft.com/office/drawing/2014/main" id="{25FCE850-397A-115C-DE7E-93A25C221F78}"/>
               </a:ext>
             </a:extLst>
           </p:cNvPr>
@@ -7374,16 +6700,20 @@
             <p:ph idx="1"/>
           </p:nvPr>
         </p:nvSpPr>
-        <p:spPr>
-          <a:xfrm>
-            <a:off x="683568" y="1988840"/>
-            <a:ext cx="3764731" cy="3960440"/>
-          </a:xfrm>
-        </p:spPr>
+        <p:spPr/>
         <p:txBody>
           <a:bodyPr/>
           <a:lstStyle/>
           <a:p>
+            <a:pPr marL="0" indent="0">
+              <a:buNone/>
+            </a:pPr>
+            <a:r>
+              <a:rPr lang="de-DE" b="1" dirty="0"/>
+              <a:t>Vorteile</a:t>
+            </a:r>
+          </a:p>
+          <a:p>
             <a:pPr>
               <a:buFont typeface="Arial" panose="020B0604020202020204" pitchFamily="34" charset="0"/>
               <a:buChar char="•"/>
@@ -7403,235 +6733,21 @@
               <a:t>Günstig</a:t>
             </a:r>
           </a:p>
-        </p:txBody>
-      </p:sp>
-      <p:sp>
-        <p:nvSpPr>
-          <p:cNvPr id="4" name="Inhaltsplatzhalter 2">
-            <a:extLst>
-              <a:ext uri="{FF2B5EF4-FFF2-40B4-BE49-F238E27FC236}">
-                <a16:creationId xmlns:a16="http://schemas.microsoft.com/office/drawing/2014/main" id="{0EDA6666-E721-7B60-2CB5-59117D00AFAA}"/>
-              </a:ext>
-            </a:extLst>
-          </p:cNvPr>
-          <p:cNvSpPr txBox="1">
-            <a:spLocks/>
-          </p:cNvSpPr>
-          <p:nvPr/>
-        </p:nvSpPr>
-        <p:spPr bwMode="auto">
-          <a:xfrm>
-            <a:off x="4693773" y="1988840"/>
-            <a:ext cx="3764731" cy="3960440"/>
-          </a:xfrm>
-          <a:prstGeom prst="rect">
-            <a:avLst/>
-          </a:prstGeom>
-          <a:noFill/>
-          <a:ln>
-            <a:noFill/>
-          </a:ln>
-          <a:extLst>
-            <a:ext uri="{909E8E84-426E-40DD-AFC4-6F175D3DCCD1}">
-              <a14:hiddenFill xmlns:a14="http://schemas.microsoft.com/office/drawing/2010/main">
-                <a:solidFill>
-                  <a:srgbClr val="FFFFFF"/>
-                </a:solidFill>
-              </a14:hiddenFill>
-            </a:ext>
-            <a:ext uri="{91240B29-F687-4F45-9708-019B960494DF}">
-              <a14:hiddenLine xmlns:a14="http://schemas.microsoft.com/office/drawing/2010/main" w="9525">
-                <a:solidFill>
-                  <a:srgbClr val="000000"/>
-                </a:solidFill>
-                <a:miter lim="800000"/>
-                <a:headEnd/>
-                <a:tailEnd/>
-              </a14:hiddenLine>
-            </a:ext>
-          </a:extLst>
-        </p:spPr>
-        <p:txBody>
-          <a:bodyPr vert="horz" wrap="square" lIns="92075" tIns="46038" rIns="92075" bIns="46038" numCol="1" anchor="t" anchorCtr="0" compatLnSpc="1">
-            <a:prstTxWarp prst="textNoShape">
-              <a:avLst/>
-            </a:prstTxWarp>
-          </a:bodyPr>
-          <a:lstStyle>
-            <a:lvl1pPr marL="342900" indent="-342900" algn="l" rtl="0" eaLnBrk="1" fontAlgn="base" hangingPunct="1">
-              <a:spcBef>
-                <a:spcPct val="20000"/>
-              </a:spcBef>
-              <a:spcAft>
-                <a:spcPct val="0"/>
-              </a:spcAft>
-              <a:buClr>
-                <a:srgbClr val="008C5A"/>
-              </a:buClr>
-              <a:buFont typeface="Monotype Sorts" pitchFamily="2" charset="2"/>
-              <a:buChar char="l"/>
-              <a:defRPr sz="2400">
-                <a:solidFill>
-                  <a:schemeClr val="tx1"/>
-                </a:solidFill>
-                <a:latin typeface="+mn-lt"/>
-                <a:ea typeface="+mn-ea"/>
-                <a:cs typeface="+mn-cs"/>
-              </a:defRPr>
-            </a:lvl1pPr>
-            <a:lvl2pPr marL="742950" indent="-285750" algn="l" rtl="0" eaLnBrk="1" fontAlgn="base" hangingPunct="1">
-              <a:spcBef>
-                <a:spcPct val="20000"/>
-              </a:spcBef>
-              <a:spcAft>
-                <a:spcPct val="0"/>
-              </a:spcAft>
-              <a:buClr>
-                <a:srgbClr val="008C5A"/>
-              </a:buClr>
-              <a:buFont typeface="Monotype Sorts" pitchFamily="2" charset="2"/>
-              <a:buChar char="l"/>
-              <a:defRPr sz="2000">
-                <a:solidFill>
-                  <a:schemeClr val="tx1"/>
-                </a:solidFill>
-                <a:latin typeface="+mn-lt"/>
-              </a:defRPr>
-            </a:lvl2pPr>
-            <a:lvl3pPr marL="1143000" indent="-228600" algn="l" rtl="0" eaLnBrk="1" fontAlgn="base" hangingPunct="1">
-              <a:spcBef>
-                <a:spcPct val="20000"/>
-              </a:spcBef>
-              <a:spcAft>
-                <a:spcPct val="0"/>
-              </a:spcAft>
-              <a:buClr>
-                <a:srgbClr val="008C5A"/>
-              </a:buClr>
-              <a:buFont typeface="Monotype Sorts" pitchFamily="2" charset="2"/>
-              <a:buChar char="l"/>
-              <a:defRPr sz="2400">
-                <a:solidFill>
-                  <a:schemeClr val="tx1"/>
-                </a:solidFill>
-                <a:latin typeface="+mn-lt"/>
-              </a:defRPr>
-            </a:lvl3pPr>
-            <a:lvl4pPr marL="1562100" indent="-228600" algn="l" rtl="0" eaLnBrk="1" fontAlgn="base" hangingPunct="1">
-              <a:spcBef>
-                <a:spcPct val="20000"/>
-              </a:spcBef>
-              <a:spcAft>
-                <a:spcPct val="0"/>
-              </a:spcAft>
-              <a:buClr>
-                <a:srgbClr val="008C5A"/>
-              </a:buClr>
-              <a:buFont typeface="Monotype Sorts" pitchFamily="2" charset="2"/>
-              <a:buChar char="l"/>
-              <a:defRPr sz="1600">
-                <a:solidFill>
-                  <a:schemeClr val="tx1"/>
-                </a:solidFill>
-                <a:latin typeface="+mn-lt"/>
-              </a:defRPr>
-            </a:lvl4pPr>
-            <a:lvl5pPr marL="1981200" indent="-228600" algn="l" rtl="0" eaLnBrk="1" fontAlgn="base" hangingPunct="1">
-              <a:spcBef>
-                <a:spcPct val="20000"/>
-              </a:spcBef>
-              <a:spcAft>
-                <a:spcPct val="0"/>
-              </a:spcAft>
-              <a:buClr>
-                <a:srgbClr val="008C5A"/>
-              </a:buClr>
-              <a:buFont typeface="Monotype Sorts" pitchFamily="2" charset="2"/>
-              <a:buChar char="l"/>
-              <a:defRPr sz="1600">
-                <a:solidFill>
-                  <a:schemeClr val="tx1"/>
-                </a:solidFill>
-                <a:latin typeface="+mn-lt"/>
-              </a:defRPr>
-            </a:lvl5pPr>
-            <a:lvl6pPr marL="2438400" indent="-228600" algn="l" rtl="0" eaLnBrk="1" fontAlgn="base" hangingPunct="1">
-              <a:spcBef>
-                <a:spcPct val="20000"/>
-              </a:spcBef>
-              <a:spcAft>
-                <a:spcPct val="0"/>
-              </a:spcAft>
-              <a:buClr>
-                <a:srgbClr val="008C5A"/>
-              </a:buClr>
-              <a:buFont typeface="Monotype Sorts" pitchFamily="2" charset="2"/>
-              <a:buChar char="l"/>
-              <a:defRPr sz="1600">
-                <a:solidFill>
-                  <a:schemeClr val="tx1"/>
-                </a:solidFill>
-                <a:latin typeface="+mn-lt"/>
-              </a:defRPr>
-            </a:lvl6pPr>
-            <a:lvl7pPr marL="2895600" indent="-228600" algn="l" rtl="0" eaLnBrk="1" fontAlgn="base" hangingPunct="1">
-              <a:spcBef>
-                <a:spcPct val="20000"/>
-              </a:spcBef>
-              <a:spcAft>
-                <a:spcPct val="0"/>
-              </a:spcAft>
-              <a:buClr>
-                <a:srgbClr val="008C5A"/>
-              </a:buClr>
-              <a:buFont typeface="Monotype Sorts" pitchFamily="2" charset="2"/>
-              <a:buChar char="l"/>
-              <a:defRPr sz="1600">
-                <a:solidFill>
-                  <a:schemeClr val="tx1"/>
-                </a:solidFill>
-                <a:latin typeface="+mn-lt"/>
-              </a:defRPr>
-            </a:lvl7pPr>
-            <a:lvl8pPr marL="3352800" indent="-228600" algn="l" rtl="0" eaLnBrk="1" fontAlgn="base" hangingPunct="1">
-              <a:spcBef>
-                <a:spcPct val="20000"/>
-              </a:spcBef>
-              <a:spcAft>
-                <a:spcPct val="0"/>
-              </a:spcAft>
-              <a:buClr>
-                <a:srgbClr val="008C5A"/>
-              </a:buClr>
-              <a:buFont typeface="Monotype Sorts" pitchFamily="2" charset="2"/>
-              <a:buChar char="l"/>
-              <a:defRPr sz="1600">
-                <a:solidFill>
-                  <a:schemeClr val="tx1"/>
-                </a:solidFill>
-                <a:latin typeface="+mn-lt"/>
-              </a:defRPr>
-            </a:lvl8pPr>
-            <a:lvl9pPr marL="3810000" indent="-228600" algn="l" rtl="0" eaLnBrk="1" fontAlgn="base" hangingPunct="1">
-              <a:spcBef>
-                <a:spcPct val="20000"/>
-              </a:spcBef>
-              <a:spcAft>
-                <a:spcPct val="0"/>
-              </a:spcAft>
-              <a:buClr>
-                <a:srgbClr val="008C5A"/>
-              </a:buClr>
-              <a:buFont typeface="Monotype Sorts" pitchFamily="2" charset="2"/>
-              <a:buChar char="l"/>
-              <a:defRPr sz="1600">
-                <a:solidFill>
-                  <a:schemeClr val="tx1"/>
-                </a:solidFill>
-                <a:latin typeface="+mn-lt"/>
-              </a:defRPr>
-            </a:lvl9pPr>
-          </a:lstStyle>
+          <a:p>
+            <a:pPr marL="0" indent="0">
+              <a:buNone/>
+            </a:pPr>
+            <a:endParaRPr lang="de-DE" dirty="0"/>
+          </a:p>
+          <a:p>
+            <a:pPr marL="0" indent="0">
+              <a:buNone/>
+            </a:pPr>
+            <a:r>
+              <a:rPr lang="de-DE" b="1" dirty="0"/>
+              <a:t>Nachteile</a:t>
+            </a:r>
+          </a:p>
           <a:p>
             <a:pPr>
               <a:buFont typeface="Arial" panose="020B0604020202020204" pitchFamily="34" charset="0"/>
@@ -7667,7 +6783,7 @@
     </p:spTree>
     <p:extLst>
       <p:ext uri="{BB962C8B-B14F-4D97-AF65-F5344CB8AC3E}">
-        <p14:creationId xmlns:p14="http://schemas.microsoft.com/office/powerpoint/2010/main" val="424821774"/>
+        <p14:creationId xmlns:p14="http://schemas.microsoft.com/office/powerpoint/2010/main" val="3074310903"/>
       </p:ext>
     </p:extLst>
   </p:cSld>
@@ -7745,14 +6861,32 @@
         </p:nvSpPr>
         <p:spPr>
           <a:xfrm>
-            <a:off x="303213" y="1844823"/>
-            <a:ext cx="8516937" cy="1296135"/>
+            <a:off x="303213" y="1268760"/>
+            <a:ext cx="8516937" cy="1911987"/>
           </a:xfrm>
         </p:spPr>
         <p:txBody>
           <a:bodyPr/>
           <a:lstStyle/>
           <a:p>
+            <a:pPr marL="0" indent="0">
+              <a:buNone/>
+            </a:pPr>
+            <a:r>
+              <a:rPr lang="de-DE" sz="2400" b="1" dirty="0">
+                <a:latin typeface="+mj-lt"/>
+              </a:rPr>
+              <a:t>Blue-Green </a:t>
+            </a:r>
+            <a:r>
+              <a:rPr lang="de-DE" sz="2400" b="1" dirty="0" err="1">
+                <a:latin typeface="+mj-lt"/>
+              </a:rPr>
+              <a:t>Deployment</a:t>
+            </a:r>
+            <a:endParaRPr lang="de-DE" b="1" dirty="0"/>
+          </a:p>
+          <a:p>
             <a:pPr>
               <a:buFont typeface="Arial" panose="020B0604020202020204" pitchFamily="34" charset="0"/>
               <a:buChar char="•"/>
@@ -7788,59 +6922,6 @@
               <a:buChar char="•"/>
             </a:pPr>
             <a:endParaRPr lang="de-DE" dirty="0"/>
-          </a:p>
-        </p:txBody>
-      </p:sp>
-      <p:sp>
-        <p:nvSpPr>
-          <p:cNvPr id="5" name="Textfeld 4">
-            <a:extLst>
-              <a:ext uri="{FF2B5EF4-FFF2-40B4-BE49-F238E27FC236}">
-                <a16:creationId xmlns:a16="http://schemas.microsoft.com/office/drawing/2014/main" id="{2329921C-13DB-F6B8-C326-D9583581E977}"/>
-              </a:ext>
-            </a:extLst>
-          </p:cNvPr>
-          <p:cNvSpPr txBox="1"/>
-          <p:nvPr/>
-        </p:nvSpPr>
-        <p:spPr bwMode="auto">
-          <a:xfrm>
-            <a:off x="330324" y="1079972"/>
-            <a:ext cx="8462714" cy="584775"/>
-          </a:xfrm>
-          <a:prstGeom prst="rect">
-            <a:avLst/>
-          </a:prstGeom>
-          <a:noFill/>
-          <a:ln w="9525">
-            <a:noFill/>
-            <a:miter lim="800000"/>
-            <a:headEnd/>
-            <a:tailEnd/>
-          </a:ln>
-        </p:spPr>
-        <p:txBody>
-          <a:bodyPr wrap="square" rtlCol="0" anchor="ctr">
-            <a:spAutoFit/>
-          </a:bodyPr>
-          <a:lstStyle/>
-          <a:p>
-            <a:pPr algn="ctr" eaLnBrk="1" hangingPunct="1"/>
-            <a:r>
-              <a:rPr lang="de-DE" sz="3200" dirty="0">
-                <a:latin typeface="+mj-lt"/>
-              </a:rPr>
-              <a:t>Blue-Green </a:t>
-            </a:r>
-            <a:r>
-              <a:rPr lang="de-DE" sz="3200" dirty="0" err="1">
-                <a:latin typeface="+mj-lt"/>
-              </a:rPr>
-              <a:t>Deployment</a:t>
-            </a:r>
-            <a:endParaRPr lang="de-DE" sz="3200" dirty="0">
-              <a:latin typeface="+mj-lt"/>
-            </a:endParaRPr>
           </a:p>
         </p:txBody>
       </p:sp>
@@ -8968,7 +8049,7 @@
           <p:cNvPr id="2" name="Titel 1">
             <a:extLst>
               <a:ext uri="{FF2B5EF4-FFF2-40B4-BE49-F238E27FC236}">
-                <a16:creationId xmlns:a16="http://schemas.microsoft.com/office/drawing/2014/main" id="{D99BAD01-A920-7F80-9D35-9B44F14A75EF}"/>
+                <a16:creationId xmlns:a16="http://schemas.microsoft.com/office/drawing/2014/main" id="{EF591ABD-50D5-A755-735A-235A68CBB955}"/>
               </a:ext>
             </a:extLst>
           </p:cNvPr>
@@ -8985,58 +8066,10 @@
           <a:lstStyle/>
           <a:p>
             <a:r>
-              <a:rPr lang="en-US" altLang="de-DE" dirty="0" err="1"/>
-              <a:t>Deplo</a:t>
-            </a:r>
-            <a:r>
-              <a:rPr lang="de-DE" altLang="de-DE" dirty="0" err="1"/>
-              <a:t>yment</a:t>
+              <a:rPr lang="en-US" altLang="de-DE" dirty="0"/>
+              <a:t>Deployment</a:t>
             </a:r>
             <a:endParaRPr lang="de-DE" dirty="0"/>
-          </a:p>
-        </p:txBody>
-      </p:sp>
-      <p:sp>
-        <p:nvSpPr>
-          <p:cNvPr id="5" name="Textfeld 4">
-            <a:extLst>
-              <a:ext uri="{FF2B5EF4-FFF2-40B4-BE49-F238E27FC236}">
-                <a16:creationId xmlns:a16="http://schemas.microsoft.com/office/drawing/2014/main" id="{B391B747-BBA4-21F1-3683-E6C2DC8AA3C6}"/>
-              </a:ext>
-            </a:extLst>
-          </p:cNvPr>
-          <p:cNvSpPr txBox="1"/>
-          <p:nvPr/>
-        </p:nvSpPr>
-        <p:spPr bwMode="auto">
-          <a:xfrm>
-            <a:off x="330324" y="1079972"/>
-            <a:ext cx="8462714" cy="584775"/>
-          </a:xfrm>
-          <a:prstGeom prst="rect">
-            <a:avLst/>
-          </a:prstGeom>
-          <a:noFill/>
-          <a:ln w="9525">
-            <a:noFill/>
-            <a:miter lim="800000"/>
-            <a:headEnd/>
-            <a:tailEnd/>
-          </a:ln>
-        </p:spPr>
-        <p:txBody>
-          <a:bodyPr wrap="square" rtlCol="0" anchor="ctr">
-            <a:spAutoFit/>
-          </a:bodyPr>
-          <a:lstStyle/>
-          <a:p>
-            <a:pPr algn="ctr" eaLnBrk="1" hangingPunct="1"/>
-            <a:r>
-              <a:rPr lang="de-DE" sz="3200" dirty="0">
-                <a:latin typeface="+mj-lt"/>
-              </a:rPr>
-              <a:t>Vor und Nachteile</a:t>
-            </a:r>
           </a:p>
         </p:txBody>
       </p:sp>
@@ -9045,7 +8078,7 @@
           <p:cNvPr id="3" name="Inhaltsplatzhalter 2">
             <a:extLst>
               <a:ext uri="{FF2B5EF4-FFF2-40B4-BE49-F238E27FC236}">
-                <a16:creationId xmlns:a16="http://schemas.microsoft.com/office/drawing/2014/main" id="{B3231207-F7BC-F792-92B9-48E8C8E01816}"/>
+                <a16:creationId xmlns:a16="http://schemas.microsoft.com/office/drawing/2014/main" id="{9BBCCEE5-8221-F691-5CC6-404256896B0E}"/>
               </a:ext>
             </a:extLst>
           </p:cNvPr>
@@ -9056,16 +8089,20 @@
             <p:ph idx="1"/>
           </p:nvPr>
         </p:nvSpPr>
-        <p:spPr>
-          <a:xfrm>
-            <a:off x="683568" y="1988840"/>
-            <a:ext cx="3764731" cy="3960440"/>
-          </a:xfrm>
-        </p:spPr>
+        <p:spPr/>
         <p:txBody>
           <a:bodyPr/>
           <a:lstStyle/>
           <a:p>
+            <a:pPr marL="0" indent="0">
+              <a:buNone/>
+            </a:pPr>
+            <a:r>
+              <a:rPr lang="de-DE" b="1" dirty="0"/>
+              <a:t>Vorteile</a:t>
+            </a:r>
+          </a:p>
+          <a:p>
             <a:pPr>
               <a:buFont typeface="Arial" panose="020B0604020202020204" pitchFamily="34" charset="0"/>
               <a:buChar char="•"/>
@@ -9096,241 +8133,20 @@
             </a:r>
           </a:p>
           <a:p>
-            <a:pPr>
-              <a:buFont typeface="Arial" panose="020B0604020202020204" pitchFamily="34" charset="0"/>
-              <a:buChar char="•"/>
-            </a:pPr>
-            <a:endParaRPr lang="de-DE" altLang="de-DE" dirty="0"/>
-          </a:p>
-        </p:txBody>
-      </p:sp>
-      <p:sp>
-        <p:nvSpPr>
-          <p:cNvPr id="4" name="Inhaltsplatzhalter 2">
-            <a:extLst>
-              <a:ext uri="{FF2B5EF4-FFF2-40B4-BE49-F238E27FC236}">
-                <a16:creationId xmlns:a16="http://schemas.microsoft.com/office/drawing/2014/main" id="{0EDA6666-E721-7B60-2CB5-59117D00AFAA}"/>
-              </a:ext>
-            </a:extLst>
-          </p:cNvPr>
-          <p:cNvSpPr txBox="1">
-            <a:spLocks/>
-          </p:cNvSpPr>
-          <p:nvPr/>
-        </p:nvSpPr>
-        <p:spPr bwMode="auto">
-          <a:xfrm>
-            <a:off x="4693773" y="1988840"/>
-            <a:ext cx="3764731" cy="3960440"/>
-          </a:xfrm>
-          <a:prstGeom prst="rect">
-            <a:avLst/>
-          </a:prstGeom>
-          <a:noFill/>
-          <a:ln>
-            <a:noFill/>
-          </a:ln>
-          <a:extLst>
-            <a:ext uri="{909E8E84-426E-40DD-AFC4-6F175D3DCCD1}">
-              <a14:hiddenFill xmlns:a14="http://schemas.microsoft.com/office/drawing/2010/main">
-                <a:solidFill>
-                  <a:srgbClr val="FFFFFF"/>
-                </a:solidFill>
-              </a14:hiddenFill>
-            </a:ext>
-            <a:ext uri="{91240B29-F687-4F45-9708-019B960494DF}">
-              <a14:hiddenLine xmlns:a14="http://schemas.microsoft.com/office/drawing/2010/main" w="9525">
-                <a:solidFill>
-                  <a:srgbClr val="000000"/>
-                </a:solidFill>
-                <a:miter lim="800000"/>
-                <a:headEnd/>
-                <a:tailEnd/>
-              </a14:hiddenLine>
-            </a:ext>
-          </a:extLst>
-        </p:spPr>
-        <p:txBody>
-          <a:bodyPr vert="horz" wrap="square" lIns="92075" tIns="46038" rIns="92075" bIns="46038" numCol="1" anchor="t" anchorCtr="0" compatLnSpc="1">
-            <a:prstTxWarp prst="textNoShape">
-              <a:avLst/>
-            </a:prstTxWarp>
-          </a:bodyPr>
-          <a:lstStyle>
-            <a:lvl1pPr marL="342900" indent="-342900" algn="l" rtl="0" eaLnBrk="1" fontAlgn="base" hangingPunct="1">
-              <a:spcBef>
-                <a:spcPct val="20000"/>
-              </a:spcBef>
-              <a:spcAft>
-                <a:spcPct val="0"/>
-              </a:spcAft>
-              <a:buClr>
-                <a:srgbClr val="008C5A"/>
-              </a:buClr>
-              <a:buFont typeface="Monotype Sorts" pitchFamily="2" charset="2"/>
-              <a:buChar char="l"/>
-              <a:defRPr sz="2400">
-                <a:solidFill>
-                  <a:schemeClr val="tx1"/>
-                </a:solidFill>
-                <a:latin typeface="+mn-lt"/>
-                <a:ea typeface="+mn-ea"/>
-                <a:cs typeface="+mn-cs"/>
-              </a:defRPr>
-            </a:lvl1pPr>
-            <a:lvl2pPr marL="742950" indent="-285750" algn="l" rtl="0" eaLnBrk="1" fontAlgn="base" hangingPunct="1">
-              <a:spcBef>
-                <a:spcPct val="20000"/>
-              </a:spcBef>
-              <a:spcAft>
-                <a:spcPct val="0"/>
-              </a:spcAft>
-              <a:buClr>
-                <a:srgbClr val="008C5A"/>
-              </a:buClr>
-              <a:buFont typeface="Monotype Sorts" pitchFamily="2" charset="2"/>
-              <a:buChar char="l"/>
-              <a:defRPr sz="2000">
-                <a:solidFill>
-                  <a:schemeClr val="tx1"/>
-                </a:solidFill>
-                <a:latin typeface="+mn-lt"/>
-              </a:defRPr>
-            </a:lvl2pPr>
-            <a:lvl3pPr marL="1143000" indent="-228600" algn="l" rtl="0" eaLnBrk="1" fontAlgn="base" hangingPunct="1">
-              <a:spcBef>
-                <a:spcPct val="20000"/>
-              </a:spcBef>
-              <a:spcAft>
-                <a:spcPct val="0"/>
-              </a:spcAft>
-              <a:buClr>
-                <a:srgbClr val="008C5A"/>
-              </a:buClr>
-              <a:buFont typeface="Monotype Sorts" pitchFamily="2" charset="2"/>
-              <a:buChar char="l"/>
-              <a:defRPr sz="2400">
-                <a:solidFill>
-                  <a:schemeClr val="tx1"/>
-                </a:solidFill>
-                <a:latin typeface="+mn-lt"/>
-              </a:defRPr>
-            </a:lvl3pPr>
-            <a:lvl4pPr marL="1562100" indent="-228600" algn="l" rtl="0" eaLnBrk="1" fontAlgn="base" hangingPunct="1">
-              <a:spcBef>
-                <a:spcPct val="20000"/>
-              </a:spcBef>
-              <a:spcAft>
-                <a:spcPct val="0"/>
-              </a:spcAft>
-              <a:buClr>
-                <a:srgbClr val="008C5A"/>
-              </a:buClr>
-              <a:buFont typeface="Monotype Sorts" pitchFamily="2" charset="2"/>
-              <a:buChar char="l"/>
-              <a:defRPr sz="1600">
-                <a:solidFill>
-                  <a:schemeClr val="tx1"/>
-                </a:solidFill>
-                <a:latin typeface="+mn-lt"/>
-              </a:defRPr>
-            </a:lvl4pPr>
-            <a:lvl5pPr marL="1981200" indent="-228600" algn="l" rtl="0" eaLnBrk="1" fontAlgn="base" hangingPunct="1">
-              <a:spcBef>
-                <a:spcPct val="20000"/>
-              </a:spcBef>
-              <a:spcAft>
-                <a:spcPct val="0"/>
-              </a:spcAft>
-              <a:buClr>
-                <a:srgbClr val="008C5A"/>
-              </a:buClr>
-              <a:buFont typeface="Monotype Sorts" pitchFamily="2" charset="2"/>
-              <a:buChar char="l"/>
-              <a:defRPr sz="1600">
-                <a:solidFill>
-                  <a:schemeClr val="tx1"/>
-                </a:solidFill>
-                <a:latin typeface="+mn-lt"/>
-              </a:defRPr>
-            </a:lvl5pPr>
-            <a:lvl6pPr marL="2438400" indent="-228600" algn="l" rtl="0" eaLnBrk="1" fontAlgn="base" hangingPunct="1">
-              <a:spcBef>
-                <a:spcPct val="20000"/>
-              </a:spcBef>
-              <a:spcAft>
-                <a:spcPct val="0"/>
-              </a:spcAft>
-              <a:buClr>
-                <a:srgbClr val="008C5A"/>
-              </a:buClr>
-              <a:buFont typeface="Monotype Sorts" pitchFamily="2" charset="2"/>
-              <a:buChar char="l"/>
-              <a:defRPr sz="1600">
-                <a:solidFill>
-                  <a:schemeClr val="tx1"/>
-                </a:solidFill>
-                <a:latin typeface="+mn-lt"/>
-              </a:defRPr>
-            </a:lvl6pPr>
-            <a:lvl7pPr marL="2895600" indent="-228600" algn="l" rtl="0" eaLnBrk="1" fontAlgn="base" hangingPunct="1">
-              <a:spcBef>
-                <a:spcPct val="20000"/>
-              </a:spcBef>
-              <a:spcAft>
-                <a:spcPct val="0"/>
-              </a:spcAft>
-              <a:buClr>
-                <a:srgbClr val="008C5A"/>
-              </a:buClr>
-              <a:buFont typeface="Monotype Sorts" pitchFamily="2" charset="2"/>
-              <a:buChar char="l"/>
-              <a:defRPr sz="1600">
-                <a:solidFill>
-                  <a:schemeClr val="tx1"/>
-                </a:solidFill>
-                <a:latin typeface="+mn-lt"/>
-              </a:defRPr>
-            </a:lvl7pPr>
-            <a:lvl8pPr marL="3352800" indent="-228600" algn="l" rtl="0" eaLnBrk="1" fontAlgn="base" hangingPunct="1">
-              <a:spcBef>
-                <a:spcPct val="20000"/>
-              </a:spcBef>
-              <a:spcAft>
-                <a:spcPct val="0"/>
-              </a:spcAft>
-              <a:buClr>
-                <a:srgbClr val="008C5A"/>
-              </a:buClr>
-              <a:buFont typeface="Monotype Sorts" pitchFamily="2" charset="2"/>
-              <a:buChar char="l"/>
-              <a:defRPr sz="1600">
-                <a:solidFill>
-                  <a:schemeClr val="tx1"/>
-                </a:solidFill>
-                <a:latin typeface="+mn-lt"/>
-              </a:defRPr>
-            </a:lvl8pPr>
-            <a:lvl9pPr marL="3810000" indent="-228600" algn="l" rtl="0" eaLnBrk="1" fontAlgn="base" hangingPunct="1">
-              <a:spcBef>
-                <a:spcPct val="20000"/>
-              </a:spcBef>
-              <a:spcAft>
-                <a:spcPct val="0"/>
-              </a:spcAft>
-              <a:buClr>
-                <a:srgbClr val="008C5A"/>
-              </a:buClr>
-              <a:buFont typeface="Monotype Sorts" pitchFamily="2" charset="2"/>
-              <a:buChar char="l"/>
-              <a:defRPr sz="1600">
-                <a:solidFill>
-                  <a:schemeClr val="tx1"/>
-                </a:solidFill>
-                <a:latin typeface="+mn-lt"/>
-              </a:defRPr>
-            </a:lvl9pPr>
-          </a:lstStyle>
+            <a:pPr marL="0" indent="0">
+              <a:buNone/>
+            </a:pPr>
+            <a:endParaRPr lang="de-DE" dirty="0"/>
+          </a:p>
+          <a:p>
+            <a:pPr marL="0" indent="0">
+              <a:buNone/>
+            </a:pPr>
+            <a:r>
+              <a:rPr lang="de-DE" b="1" dirty="0"/>
+              <a:t>Nachteile</a:t>
+            </a:r>
+          </a:p>
           <a:p>
             <a:pPr>
               <a:buFont typeface="Arial" panose="020B0604020202020204" pitchFamily="34" charset="0"/>
@@ -9366,7 +8182,7 @@
     </p:spTree>
     <p:extLst>
       <p:ext uri="{BB962C8B-B14F-4D97-AF65-F5344CB8AC3E}">
-        <p14:creationId xmlns:p14="http://schemas.microsoft.com/office/powerpoint/2010/main" val="2441999377"/>
+        <p14:creationId xmlns:p14="http://schemas.microsoft.com/office/powerpoint/2010/main" val="617239567"/>
       </p:ext>
     </p:extLst>
   </p:cSld>
@@ -9444,7 +8260,7 @@
         </p:nvSpPr>
         <p:spPr>
           <a:xfrm>
-            <a:off x="303213" y="1844823"/>
+            <a:off x="303213" y="1268769"/>
             <a:ext cx="8516937" cy="1296135"/>
           </a:xfrm>
         </p:spPr>
@@ -9452,6 +8268,30 @@
           <a:bodyPr/>
           <a:lstStyle/>
           <a:p>
+            <a:pPr marL="0" indent="0">
+              <a:buNone/>
+            </a:pPr>
+            <a:r>
+              <a:rPr lang="de-DE" sz="2400" b="1" dirty="0" err="1">
+                <a:latin typeface="+mj-lt"/>
+              </a:rPr>
+              <a:t>Red</a:t>
+            </a:r>
+            <a:r>
+              <a:rPr lang="de-DE" sz="2400" b="1" dirty="0">
+                <a:latin typeface="+mj-lt"/>
+              </a:rPr>
+              <a:t>-Black </a:t>
+            </a:r>
+            <a:r>
+              <a:rPr lang="de-DE" sz="2400" b="1" dirty="0" err="1">
+                <a:latin typeface="+mj-lt"/>
+              </a:rPr>
+              <a:t>Deployment</a:t>
+            </a:r>
+            <a:endParaRPr lang="de-DE" b="1" dirty="0"/>
+          </a:p>
+          <a:p>
             <a:pPr>
               <a:buFont typeface="Arial" panose="020B0604020202020204" pitchFamily="34" charset="0"/>
               <a:buChar char="•"/>
@@ -9477,65 +8317,6 @@
               <a:buChar char="•"/>
             </a:pPr>
             <a:endParaRPr lang="de-DE" dirty="0"/>
-          </a:p>
-        </p:txBody>
-      </p:sp>
-      <p:sp>
-        <p:nvSpPr>
-          <p:cNvPr id="5" name="Textfeld 4">
-            <a:extLst>
-              <a:ext uri="{FF2B5EF4-FFF2-40B4-BE49-F238E27FC236}">
-                <a16:creationId xmlns:a16="http://schemas.microsoft.com/office/drawing/2014/main" id="{2329921C-13DB-F6B8-C326-D9583581E977}"/>
-              </a:ext>
-            </a:extLst>
-          </p:cNvPr>
-          <p:cNvSpPr txBox="1"/>
-          <p:nvPr/>
-        </p:nvSpPr>
-        <p:spPr bwMode="auto">
-          <a:xfrm>
-            <a:off x="330324" y="1079972"/>
-            <a:ext cx="8462714" cy="584775"/>
-          </a:xfrm>
-          <a:prstGeom prst="rect">
-            <a:avLst/>
-          </a:prstGeom>
-          <a:noFill/>
-          <a:ln w="9525">
-            <a:noFill/>
-            <a:miter lim="800000"/>
-            <a:headEnd/>
-            <a:tailEnd/>
-          </a:ln>
-        </p:spPr>
-        <p:txBody>
-          <a:bodyPr wrap="square" rtlCol="0" anchor="ctr">
-            <a:spAutoFit/>
-          </a:bodyPr>
-          <a:lstStyle/>
-          <a:p>
-            <a:pPr algn="ctr" eaLnBrk="1" hangingPunct="1"/>
-            <a:r>
-              <a:rPr lang="de-DE" sz="3200" dirty="0" err="1">
-                <a:latin typeface="+mj-lt"/>
-              </a:rPr>
-              <a:t>Red</a:t>
-            </a:r>
-            <a:r>
-              <a:rPr lang="de-DE" sz="3200" dirty="0">
-                <a:latin typeface="+mj-lt"/>
-              </a:rPr>
-              <a:t>-Black </a:t>
-            </a:r>
-            <a:r>
-              <a:rPr lang="de-DE" sz="3200" dirty="0" err="1">
-                <a:latin typeface="+mj-lt"/>
-              </a:rPr>
-              <a:t>Deployment</a:t>
-            </a:r>
-            <a:endParaRPr lang="de-DE" sz="3200" dirty="0">
-              <a:latin typeface="+mj-lt"/>
-            </a:endParaRPr>
           </a:p>
         </p:txBody>
       </p:sp>
@@ -10718,7 +9499,7 @@
         </p:nvSpPr>
         <p:spPr>
           <a:xfrm>
-            <a:off x="303213" y="1844823"/>
+            <a:off x="303213" y="1268760"/>
             <a:ext cx="8516937" cy="1656185"/>
           </a:xfrm>
         </p:spPr>
@@ -10726,6 +9507,24 @@
           <a:bodyPr/>
           <a:lstStyle/>
           <a:p>
+            <a:pPr marL="0" indent="0">
+              <a:buNone/>
+            </a:pPr>
+            <a:r>
+              <a:rPr lang="de-DE" sz="2400" b="1" dirty="0">
+                <a:latin typeface="+mj-lt"/>
+              </a:rPr>
+              <a:t>Canary </a:t>
+            </a:r>
+            <a:r>
+              <a:rPr lang="de-DE" sz="2400" b="1" dirty="0" err="1">
+                <a:latin typeface="+mj-lt"/>
+              </a:rPr>
+              <a:t>Deployment</a:t>
+            </a:r>
+            <a:endParaRPr lang="de-DE" b="1" dirty="0"/>
+          </a:p>
+          <a:p>
             <a:pPr>
               <a:buFont typeface="Arial" panose="020B0604020202020204" pitchFamily="34" charset="0"/>
               <a:buChar char="•"/>
@@ -10748,50 +9547,6 @@
             <a:r>
               <a:rPr lang="de-DE" dirty="0"/>
               <a:t>Test der Version mit Testgruppe</a:t>
-            </a:r>
-          </a:p>
-        </p:txBody>
-      </p:sp>
-      <p:sp>
-        <p:nvSpPr>
-          <p:cNvPr id="5" name="Textfeld 4">
-            <a:extLst>
-              <a:ext uri="{FF2B5EF4-FFF2-40B4-BE49-F238E27FC236}">
-                <a16:creationId xmlns:a16="http://schemas.microsoft.com/office/drawing/2014/main" id="{2329921C-13DB-F6B8-C326-D9583581E977}"/>
-              </a:ext>
-            </a:extLst>
-          </p:cNvPr>
-          <p:cNvSpPr txBox="1"/>
-          <p:nvPr/>
-        </p:nvSpPr>
-        <p:spPr bwMode="auto">
-          <a:xfrm>
-            <a:off x="330324" y="1079972"/>
-            <a:ext cx="8462714" cy="584775"/>
-          </a:xfrm>
-          <a:prstGeom prst="rect">
-            <a:avLst/>
-          </a:prstGeom>
-          <a:noFill/>
-          <a:ln w="9525">
-            <a:noFill/>
-            <a:miter lim="800000"/>
-            <a:headEnd/>
-            <a:tailEnd/>
-          </a:ln>
-        </p:spPr>
-        <p:txBody>
-          <a:bodyPr wrap="square" rtlCol="0" anchor="ctr">
-            <a:spAutoFit/>
-          </a:bodyPr>
-          <a:lstStyle/>
-          <a:p>
-            <a:pPr algn="ctr" eaLnBrk="1" hangingPunct="1"/>
-            <a:r>
-              <a:rPr lang="de-DE" sz="3200" dirty="0">
-                <a:latin typeface="+mj-lt"/>
-              </a:rPr>
-              <a:t>Canary Deploy</a:t>
             </a:r>
           </a:p>
         </p:txBody>

</xml_diff>